<commit_message>
Added POJO to deserialize from JSON weather data
</commit_message>
<xml_diff>
--- a/docs/lesson_telegram_bot.pptx
+++ b/docs/lesson_telegram_bot.pptx
@@ -5,7 +5,7 @@
     <p:sldMasterId id="2147483648" r:id="rId1"/>
   </p:sldMasterIdLst>
   <p:notesMasterIdLst>
-    <p:notesMasterId r:id="rId31"/>
+    <p:notesMasterId r:id="rId29"/>
   </p:notesMasterIdLst>
   <p:sldIdLst>
     <p:sldId id="256" r:id="rId2"/>
@@ -34,9 +34,7 @@
     <p:sldId id="349" r:id="rId25"/>
     <p:sldId id="347" r:id="rId26"/>
     <p:sldId id="350" r:id="rId27"/>
-    <p:sldId id="351" r:id="rId28"/>
-    <p:sldId id="352" r:id="rId29"/>
-    <p:sldId id="305" r:id="rId30"/>
+    <p:sldId id="305" r:id="rId28"/>
   </p:sldIdLst>
   <p:sldSz cx="12192000" cy="6858000"/>
   <p:notesSz cx="6858000" cy="9144000"/>
@@ -166,8 +164,6 @@
             <p14:sldId id="349"/>
             <p14:sldId id="347"/>
             <p14:sldId id="350"/>
-            <p14:sldId id="351"/>
-            <p14:sldId id="352"/>
           </p14:sldIdLst>
         </p14:section>
         <p14:section name="Untitled Section" id="{03EDBFE7-8776-46A4-ACAB-D76136498E89}">
@@ -277,7 +273,7 @@
           <a:p>
             <a:fld id="{02324BB6-ADF9-477E-BA61-F60537F49E1A}" type="datetimeFigureOut">
               <a:rPr lang="ru-RU" smtClean="0"/>
-              <a:t>02.12.2020</a:t>
+              <a:t>03.12.2020</a:t>
             </a:fld>
             <a:endParaRPr lang="ru-RU"/>
           </a:p>
@@ -726,7 +722,7 @@
           <a:p>
             <a:fld id="{FC1A96A7-B107-4A76-9BCA-351E6EBF71DD}" type="datetimeFigureOut">
               <a:rPr lang="ru-RU" smtClean="0"/>
-              <a:t>02.12.2020</a:t>
+              <a:t>03.12.2020</a:t>
             </a:fld>
             <a:endParaRPr lang="ru-RU"/>
           </a:p>
@@ -903,7 +899,7 @@
           <a:p>
             <a:fld id="{FC1A96A7-B107-4A76-9BCA-351E6EBF71DD}" type="datetimeFigureOut">
               <a:rPr lang="ru-RU" smtClean="0"/>
-              <a:t>02.12.2020</a:t>
+              <a:t>03.12.2020</a:t>
             </a:fld>
             <a:endParaRPr lang="ru-RU"/>
           </a:p>
@@ -1083,7 +1079,7 @@
           <a:p>
             <a:fld id="{FC1A96A7-B107-4A76-9BCA-351E6EBF71DD}" type="datetimeFigureOut">
               <a:rPr lang="ru-RU" smtClean="0"/>
-              <a:t>02.12.2020</a:t>
+              <a:t>03.12.2020</a:t>
             </a:fld>
             <a:endParaRPr lang="ru-RU"/>
           </a:p>
@@ -1253,7 +1249,7 @@
           <a:p>
             <a:fld id="{FC1A96A7-B107-4A76-9BCA-351E6EBF71DD}" type="datetimeFigureOut">
               <a:rPr lang="ru-RU" smtClean="0"/>
-              <a:t>02.12.2020</a:t>
+              <a:t>03.12.2020</a:t>
             </a:fld>
             <a:endParaRPr lang="ru-RU"/>
           </a:p>
@@ -1499,7 +1495,7 @@
           <a:p>
             <a:fld id="{FC1A96A7-B107-4A76-9BCA-351E6EBF71DD}" type="datetimeFigureOut">
               <a:rPr lang="ru-RU" smtClean="0"/>
-              <a:t>02.12.2020</a:t>
+              <a:t>03.12.2020</a:t>
             </a:fld>
             <a:endParaRPr lang="ru-RU"/>
           </a:p>
@@ -1787,7 +1783,7 @@
           <a:p>
             <a:fld id="{FC1A96A7-B107-4A76-9BCA-351E6EBF71DD}" type="datetimeFigureOut">
               <a:rPr lang="ru-RU" smtClean="0"/>
-              <a:t>02.12.2020</a:t>
+              <a:t>03.12.2020</a:t>
             </a:fld>
             <a:endParaRPr lang="ru-RU"/>
           </a:p>
@@ -2209,7 +2205,7 @@
           <a:p>
             <a:fld id="{FC1A96A7-B107-4A76-9BCA-351E6EBF71DD}" type="datetimeFigureOut">
               <a:rPr lang="ru-RU" smtClean="0"/>
-              <a:t>02.12.2020</a:t>
+              <a:t>03.12.2020</a:t>
             </a:fld>
             <a:endParaRPr lang="ru-RU"/>
           </a:p>
@@ -2327,7 +2323,7 @@
           <a:p>
             <a:fld id="{FC1A96A7-B107-4A76-9BCA-351E6EBF71DD}" type="datetimeFigureOut">
               <a:rPr lang="ru-RU" smtClean="0"/>
-              <a:t>02.12.2020</a:t>
+              <a:t>03.12.2020</a:t>
             </a:fld>
             <a:endParaRPr lang="ru-RU"/>
           </a:p>
@@ -2422,7 +2418,7 @@
           <a:p>
             <a:fld id="{FC1A96A7-B107-4A76-9BCA-351E6EBF71DD}" type="datetimeFigureOut">
               <a:rPr lang="ru-RU" smtClean="0"/>
-              <a:t>02.12.2020</a:t>
+              <a:t>03.12.2020</a:t>
             </a:fld>
             <a:endParaRPr lang="ru-RU"/>
           </a:p>
@@ -2699,7 +2695,7 @@
           <a:p>
             <a:fld id="{FC1A96A7-B107-4A76-9BCA-351E6EBF71DD}" type="datetimeFigureOut">
               <a:rPr lang="ru-RU" smtClean="0"/>
-              <a:t>02.12.2020</a:t>
+              <a:t>03.12.2020</a:t>
             </a:fld>
             <a:endParaRPr lang="ru-RU"/>
           </a:p>
@@ -2952,7 +2948,7 @@
           <a:p>
             <a:fld id="{FC1A96A7-B107-4A76-9BCA-351E6EBF71DD}" type="datetimeFigureOut">
               <a:rPr lang="ru-RU" smtClean="0"/>
-              <a:t>02.12.2020</a:t>
+              <a:t>03.12.2020</a:t>
             </a:fld>
             <a:endParaRPr lang="ru-RU"/>
           </a:p>
@@ -3165,7 +3161,7 @@
           <a:p>
             <a:fld id="{FC1A96A7-B107-4A76-9BCA-351E6EBF71DD}" type="datetimeFigureOut">
               <a:rPr lang="ru-RU" smtClean="0"/>
-              <a:t>02.12.2020</a:t>
+              <a:t>03.12.2020</a:t>
             </a:fld>
             <a:endParaRPr lang="ru-RU"/>
           </a:p>
@@ -4291,15 +4287,7 @@
             </a:r>
             <a:r>
               <a:rPr lang="ru-RU" sz="3200" dirty="0" smtClean="0"/>
-              <a:t>на</a:t>
-            </a:r>
-            <a:r>
-              <a:rPr lang="ru-RU" sz="3200" dirty="0" smtClean="0"/>
-              <a:t> </a:t>
-            </a:r>
-            <a:r>
-              <a:rPr lang="ru-RU" sz="3200" dirty="0" smtClean="0"/>
-              <a:t>базе архетипа </a:t>
+              <a:t>на базе архетипа </a:t>
             </a:r>
             <a:r>
               <a:rPr lang="en-US" sz="3200" dirty="0" smtClean="0"/>
@@ -4354,11 +4342,7 @@
             </a:pPr>
             <a:r>
               <a:rPr lang="ru-RU" sz="3200" dirty="0" smtClean="0"/>
-              <a:t>Создаем </a:t>
-            </a:r>
-            <a:r>
-              <a:rPr lang="ru-RU" sz="3200" dirty="0" smtClean="0"/>
-              <a:t>класс </a:t>
+              <a:t>Создаем класс </a:t>
             </a:r>
             <a:r>
               <a:rPr lang="uk-UA" sz="3200" dirty="0" smtClean="0"/>
@@ -4366,11 +4350,7 @@
             </a:r>
             <a:r>
               <a:rPr lang="ru-RU" sz="3200" dirty="0" smtClean="0"/>
-              <a:t> </a:t>
-            </a:r>
-            <a:r>
-              <a:rPr lang="ru-RU" sz="3200" dirty="0" smtClean="0"/>
-              <a:t>производный от </a:t>
+              <a:t> производный от </a:t>
             </a:r>
             <a:r>
               <a:rPr lang="en-US" sz="3200" b="1" dirty="0" err="1" smtClean="0"/>
@@ -4407,7 +4387,6 @@
               <a:rPr lang="en-US" sz="3200" dirty="0" smtClean="0"/>
               <a:t>)</a:t>
             </a:r>
-            <a:endParaRPr lang="en-US" sz="3200" dirty="0" smtClean="0"/>
           </a:p>
           <a:p>
             <a:pPr marL="457200" indent="-457200">
@@ -4415,11 +4394,7 @@
             </a:pPr>
             <a:r>
               <a:rPr lang="ru-RU" sz="3200" dirty="0" smtClean="0"/>
-              <a:t>Регистрируем </a:t>
-            </a:r>
-            <a:r>
-              <a:rPr lang="ru-RU" sz="3200" dirty="0" smtClean="0"/>
-              <a:t>через </a:t>
+              <a:t>Регистрируем через </a:t>
             </a:r>
             <a:r>
               <a:rPr lang="en-US" sz="3200" b="1" dirty="0" err="1" smtClean="0"/>
@@ -6945,150 +6920,6 @@
 </file>
 
 <file path=ppt/slides/slide27.xml><?xml version="1.0" encoding="utf-8"?>
-<p:sld xmlns:a="http://schemas.openxmlformats.org/drawingml/2006/main" xmlns:r="http://schemas.openxmlformats.org/officeDocument/2006/relationships" xmlns:p="http://schemas.openxmlformats.org/presentationml/2006/main">
-  <p:cSld>
-    <p:spTree>
-      <p:nvGrpSpPr>
-        <p:cNvPr id="1" name=""/>
-        <p:cNvGrpSpPr/>
-        <p:nvPr/>
-      </p:nvGrpSpPr>
-      <p:grpSpPr>
-        <a:xfrm>
-          <a:off x="0" y="0"/>
-          <a:ext cx="0" cy="0"/>
-          <a:chOff x="0" y="0"/>
-          <a:chExt cx="0" cy="0"/>
-        </a:xfrm>
-      </p:grpSpPr>
-      <p:sp>
-        <p:nvSpPr>
-          <p:cNvPr id="2" name="Title 1"/>
-          <p:cNvSpPr>
-            <a:spLocks noGrp="1"/>
-          </p:cNvSpPr>
-          <p:nvPr>
-            <p:ph type="title"/>
-          </p:nvPr>
-        </p:nvSpPr>
-        <p:spPr/>
-        <p:txBody>
-          <a:bodyPr/>
-          <a:lstStyle/>
-          <a:p>
-            <a:r>
-              <a:rPr lang="en-US" dirty="0"/>
-              <a:t>Replies</a:t>
-            </a:r>
-            <a:endParaRPr lang="ru-RU" dirty="0"/>
-          </a:p>
-        </p:txBody>
-      </p:sp>
-      <p:pic>
-        <p:nvPicPr>
-          <p:cNvPr id="3" name="Picture 2"/>
-          <p:cNvPicPr>
-            <a:picLocks noChangeAspect="1"/>
-          </p:cNvPicPr>
-          <p:nvPr/>
-        </p:nvPicPr>
-        <p:blipFill>
-          <a:blip r:embed="rId2"/>
-          <a:stretch>
-            <a:fillRect/>
-          </a:stretch>
-        </p:blipFill>
-        <p:spPr>
-          <a:xfrm>
-            <a:off x="796516" y="1268760"/>
-            <a:ext cx="10598968" cy="5470698"/>
-          </a:xfrm>
-          <a:prstGeom prst="rect">
-            <a:avLst/>
-          </a:prstGeom>
-        </p:spPr>
-      </p:pic>
-    </p:spTree>
-    <p:extLst>
-      <p:ext uri="{BB962C8B-B14F-4D97-AF65-F5344CB8AC3E}">
-        <p14:creationId xmlns:p14="http://schemas.microsoft.com/office/powerpoint/2010/main" val="1974506904"/>
-      </p:ext>
-    </p:extLst>
-  </p:cSld>
-  <p:clrMapOvr>
-    <a:masterClrMapping/>
-  </p:clrMapOvr>
-  <p:timing>
-    <p:tnLst>
-      <p:par>
-        <p:cTn id="1" dur="indefinite" restart="never" nodeType="tmRoot"/>
-      </p:par>
-    </p:tnLst>
-  </p:timing>
-</p:sld>
-</file>
-
-<file path=ppt/slides/slide28.xml><?xml version="1.0" encoding="utf-8"?>
-<p:sld xmlns:a="http://schemas.openxmlformats.org/drawingml/2006/main" xmlns:r="http://schemas.openxmlformats.org/officeDocument/2006/relationships" xmlns:p="http://schemas.openxmlformats.org/presentationml/2006/main">
-  <p:cSld>
-    <p:spTree>
-      <p:nvGrpSpPr>
-        <p:cNvPr id="1" name=""/>
-        <p:cNvGrpSpPr/>
-        <p:nvPr/>
-      </p:nvGrpSpPr>
-      <p:grpSpPr>
-        <a:xfrm>
-          <a:off x="0" y="0"/>
-          <a:ext cx="0" cy="0"/>
-          <a:chOff x="0" y="0"/>
-          <a:chExt cx="0" cy="0"/>
-        </a:xfrm>
-      </p:grpSpPr>
-      <p:sp>
-        <p:nvSpPr>
-          <p:cNvPr id="2" name="Title 1"/>
-          <p:cNvSpPr>
-            <a:spLocks noGrp="1"/>
-          </p:cNvSpPr>
-          <p:nvPr>
-            <p:ph type="title"/>
-          </p:nvPr>
-        </p:nvSpPr>
-        <p:spPr/>
-        <p:txBody>
-          <a:bodyPr/>
-          <a:lstStyle/>
-          <a:p>
-            <a:r>
-              <a:rPr lang="en-US" dirty="0"/>
-              <a:t>Ability Reply</a:t>
-            </a:r>
-            <a:endParaRPr lang="ru-RU" dirty="0"/>
-          </a:p>
-        </p:txBody>
-      </p:sp>
-    </p:spTree>
-    <p:extLst>
-      <p:ext uri="{BB962C8B-B14F-4D97-AF65-F5344CB8AC3E}">
-        <p14:creationId xmlns:p14="http://schemas.microsoft.com/office/powerpoint/2010/main" val="4017405983"/>
-      </p:ext>
-    </p:extLst>
-  </p:cSld>
-  <p:clrMapOvr>
-    <a:masterClrMapping/>
-  </p:clrMapOvr>
-  <p:timing>
-    <p:tnLst>
-      <p:par>
-        <p:cTn id="1" dur="indefinite" restart="never" nodeType="tmRoot"/>
-      </p:par>
-    </p:tnLst>
-  </p:timing>
-</p:sld>
-</file>
-
-<file path=ppt/slides/slide29.xml><?xml version="1.0" encoding="utf-8"?>
 <p:sld xmlns:a="http://schemas.openxmlformats.org/drawingml/2006/main" xmlns:r="http://schemas.openxmlformats.org/officeDocument/2006/relationships" xmlns:p="http://schemas.openxmlformats.org/presentationml/2006/main">
   <p:cSld>
     <p:spTree>

</xml_diff>